<commit_message>
add race results view
</commit_message>
<xml_diff>
--- a/Final_project_spec.pptx
+++ b/Final_project_spec.pptx
@@ -3507,7 +3507,7 @@
           <p:cNvPr id="7" name="Прямоугольник 5">
             <a:extLst>
               <a:ext uri="{FF2B5EF4-FFF2-40B4-BE49-F238E27FC236}">
-                <a16:creationId xmlns="" xmlns:a16="http://schemas.microsoft.com/office/drawing/2014/main" id="{71630723-7A98-433D-9C49-80E72ACE0DF0}"/>
+                <a16:creationId xmlns:a16="http://schemas.microsoft.com/office/drawing/2014/main" xmlns="" id="{71630723-7A98-433D-9C49-80E72ACE0DF0}"/>
               </a:ext>
             </a:extLst>
           </p:cNvPr>
@@ -3623,7 +3623,7 @@
           <p:cNvPr id="13" name="Прямоугольник 5">
             <a:extLst>
               <a:ext uri="{FF2B5EF4-FFF2-40B4-BE49-F238E27FC236}">
-                <a16:creationId xmlns="" xmlns:a16="http://schemas.microsoft.com/office/drawing/2014/main" id="{71630723-7A98-433D-9C49-80E72ACE0DF0}"/>
+                <a16:creationId xmlns:a16="http://schemas.microsoft.com/office/drawing/2014/main" xmlns="" id="{71630723-7A98-433D-9C49-80E72ACE0DF0}"/>
               </a:ext>
             </a:extLst>
           </p:cNvPr>
@@ -3810,7 +3810,7 @@
           <p:cNvPr id="17" name="Прямоугольник 5">
             <a:extLst>
               <a:ext uri="{FF2B5EF4-FFF2-40B4-BE49-F238E27FC236}">
-                <a16:creationId xmlns="" xmlns:a16="http://schemas.microsoft.com/office/drawing/2014/main" id="{71630723-7A98-433D-9C49-80E72ACE0DF0}"/>
+                <a16:creationId xmlns:a16="http://schemas.microsoft.com/office/drawing/2014/main" xmlns="" id="{71630723-7A98-433D-9C49-80E72ACE0DF0}"/>
               </a:ext>
             </a:extLst>
           </p:cNvPr>
@@ -4032,7 +4032,7 @@
             <p:cNvPr id="7" name="Прямоугольник 5">
               <a:extLst>
                 <a:ext uri="{FF2B5EF4-FFF2-40B4-BE49-F238E27FC236}">
-                  <a16:creationId xmlns="" xmlns:a16="http://schemas.microsoft.com/office/drawing/2014/main" id="{71630723-7A98-433D-9C49-80E72ACE0DF0}"/>
+                  <a16:creationId xmlns:a16="http://schemas.microsoft.com/office/drawing/2014/main" xmlns="" id="{71630723-7A98-433D-9C49-80E72ACE0DF0}"/>
                 </a:ext>
               </a:extLst>
             </p:cNvPr>
@@ -4557,7 +4557,7 @@
           <p:cNvPr id="7" name="Прямоугольник 5">
             <a:extLst>
               <a:ext uri="{FF2B5EF4-FFF2-40B4-BE49-F238E27FC236}">
-                <a16:creationId xmlns="" xmlns:a16="http://schemas.microsoft.com/office/drawing/2014/main" id="{71630723-7A98-433D-9C49-80E72ACE0DF0}"/>
+                <a16:creationId xmlns:a16="http://schemas.microsoft.com/office/drawing/2014/main" xmlns="" id="{71630723-7A98-433D-9C49-80E72ACE0DF0}"/>
               </a:ext>
             </a:extLst>
           </p:cNvPr>
@@ -4633,12 +4633,16 @@
               <a:buChar char="§"/>
             </a:pPr>
             <a:r>
-              <a:rPr lang="en-US" sz="1600" dirty="0" smtClean="0">
+              <a:rPr lang="en-US" sz="1600" dirty="0" err="1" smtClean="0">
                 <a:latin typeface="Times New Roman" panose="02020603050405020304" pitchFamily="18" charset="0"/>
                 <a:cs typeface="Times New Roman" panose="02020603050405020304" pitchFamily="18" charset="0"/>
               </a:rPr>
-              <a:t>Dependency injection</a:t>
-            </a:r>
+              <a:t>Ninject</a:t>
+            </a:r>
+            <a:endParaRPr lang="en-US" sz="1600" dirty="0" smtClean="0">
+              <a:latin typeface="Times New Roman" panose="02020603050405020304" pitchFamily="18" charset="0"/>
+              <a:cs typeface="Times New Roman" panose="02020603050405020304" pitchFamily="18" charset="0"/>
+            </a:endParaRPr>
           </a:p>
           <a:p>
             <a:pPr marL="742950" lvl="1" indent="-285750">
@@ -4714,25 +4718,11 @@
               <a:buChar char="§"/>
             </a:pPr>
             <a:r>
-              <a:rPr lang="en-US" sz="1600" dirty="0" err="1" smtClean="0">
-                <a:latin typeface="Times New Roman" panose="02020603050405020304" pitchFamily="18" charset="0"/>
-                <a:cs typeface="Times New Roman" panose="02020603050405020304" pitchFamily="18" charset="0"/>
-              </a:rPr>
-              <a:t>Async</a:t>
-            </a:r>
-            <a:r>
-              <a:rPr lang="en-US" sz="1600" dirty="0" smtClean="0">
-                <a:latin typeface="Times New Roman" panose="02020603050405020304" pitchFamily="18" charset="0"/>
-                <a:cs typeface="Times New Roman" panose="02020603050405020304" pitchFamily="18" charset="0"/>
-              </a:rPr>
-              <a:t>/await </a:t>
-            </a:r>
-            <a:r>
               <a:rPr lang="" sz="1600" dirty="0" smtClean="0">
                 <a:latin typeface="Times New Roman" panose="02020603050405020304" pitchFamily="18" charset="0"/>
                 <a:cs typeface="Times New Roman" panose="02020603050405020304" pitchFamily="18" charset="0"/>
               </a:rPr>
-              <a:t>при работе </a:t>
+              <a:t>Асинхронные </a:t>
             </a:r>
             <a:r>
               <a:rPr lang="en-US" sz="1600" dirty="0" smtClean="0">
@@ -4746,7 +4736,14 @@
                 <a:latin typeface="Times New Roman" panose="02020603050405020304" pitchFamily="18" charset="0"/>
                 <a:cs typeface="Times New Roman" panose="02020603050405020304" pitchFamily="18" charset="0"/>
               </a:rPr>
-              <a:t>операций</a:t>
+              <a:t>операци</a:t>
+            </a:r>
+            <a:r>
+              <a:rPr lang="" sz="1600" dirty="0" smtClean="0">
+                <a:latin typeface="Times New Roman" panose="02020603050405020304" pitchFamily="18" charset="0"/>
+                <a:cs typeface="Times New Roman" panose="02020603050405020304" pitchFamily="18" charset="0"/>
+              </a:rPr>
+              <a:t>и</a:t>
             </a:r>
             <a:endParaRPr lang="en-US" sz="1600" dirty="0" smtClean="0">
               <a:latin typeface="Times New Roman" panose="02020603050405020304" pitchFamily="18" charset="0"/>
@@ -4837,18 +4834,18 @@
               <a:buChar char="§"/>
             </a:pPr>
             <a:r>
-              <a:rPr lang="" sz="1600" dirty="0" smtClean="0">
-                <a:latin typeface="Times New Roman" panose="02020603050405020304" pitchFamily="18" charset="0"/>
-                <a:cs typeface="Times New Roman" panose="02020603050405020304" pitchFamily="18" charset="0"/>
-              </a:rPr>
-              <a:t>Авторизация с помощью </a:t>
-            </a:r>
-            <a:r>
               <a:rPr lang="en-US" sz="1600" dirty="0" smtClean="0">
                 <a:latin typeface="Times New Roman" panose="02020603050405020304" pitchFamily="18" charset="0"/>
                 <a:cs typeface="Times New Roman" panose="02020603050405020304" pitchFamily="18" charset="0"/>
               </a:rPr>
-              <a:t>Microsoft Identity</a:t>
+              <a:t>Microsoft </a:t>
+            </a:r>
+            <a:r>
+              <a:rPr lang="en-US" sz="1600" dirty="0" smtClean="0">
+                <a:latin typeface="Times New Roman" panose="02020603050405020304" pitchFamily="18" charset="0"/>
+                <a:cs typeface="Times New Roman" panose="02020603050405020304" pitchFamily="18" charset="0"/>
+              </a:rPr>
+              <a:t>Identity</a:t>
             </a:r>
             <a:endParaRPr lang="" sz="1600" dirty="0">
               <a:latin typeface="Times New Roman" panose="02020603050405020304" pitchFamily="18" charset="0"/>
@@ -4949,7 +4946,7 @@
           <p:cNvPr id="7" name="Прямоугольник 5">
             <a:extLst>
               <a:ext uri="{FF2B5EF4-FFF2-40B4-BE49-F238E27FC236}">
-                <a16:creationId xmlns="" xmlns:a16="http://schemas.microsoft.com/office/drawing/2014/main" id="{71630723-7A98-433D-9C49-80E72ACE0DF0}"/>
+                <a16:creationId xmlns:a16="http://schemas.microsoft.com/office/drawing/2014/main" xmlns="" id="{71630723-7A98-433D-9C49-80E72ACE0DF0}"/>
               </a:ext>
             </a:extLst>
           </p:cNvPr>

</xml_diff>